<commit_message>
Full rough draft complete
Completed the first full draft of PDD
</commit_message>
<xml_diff>
--- a/SDL-IREC-2020/figs/team_hierarchy.pptx
+++ b/SDL-IREC-2020/figs/team_hierarchy.pptx
@@ -104,6 +104,11 @@
       </a:defRPr>
     </a:lvl9pPr>
   </p:defaultTextStyle>
+  <p:extLst>
+    <p:ext uri="{EFAFB233-063F-42B5-8137-9DF3F51BA10A}">
+      <p15:sldGuideLst xmlns:p15="http://schemas.microsoft.com/office/powerpoint/2012/main"/>
+    </p:ext>
+  </p:extLst>
 </p:presentation>
 </file>
 
@@ -238,7 +243,7 @@
           <a:p>
             <a:fld id="{FF9C6F78-307D-4E37-89B5-F2F94C8E61CA}" type="datetimeFigureOut">
               <a:rPr lang="en-US" smtClean="0"/>
-              <a:t>7/22/2019</a:t>
+              <a:t>7/27/2019</a:t>
             </a:fld>
             <a:endParaRPr lang="en-US"/>
           </a:p>
@@ -408,7 +413,7 @@
           <a:p>
             <a:fld id="{FF9C6F78-307D-4E37-89B5-F2F94C8E61CA}" type="datetimeFigureOut">
               <a:rPr lang="en-US" smtClean="0"/>
-              <a:t>7/22/2019</a:t>
+              <a:t>7/27/2019</a:t>
             </a:fld>
             <a:endParaRPr lang="en-US"/>
           </a:p>
@@ -588,7 +593,7 @@
           <a:p>
             <a:fld id="{FF9C6F78-307D-4E37-89B5-F2F94C8E61CA}" type="datetimeFigureOut">
               <a:rPr lang="en-US" smtClean="0"/>
-              <a:t>7/22/2019</a:t>
+              <a:t>7/27/2019</a:t>
             </a:fld>
             <a:endParaRPr lang="en-US"/>
           </a:p>
@@ -758,7 +763,7 @@
           <a:p>
             <a:fld id="{FF9C6F78-307D-4E37-89B5-F2F94C8E61CA}" type="datetimeFigureOut">
               <a:rPr lang="en-US" smtClean="0"/>
-              <a:t>7/22/2019</a:t>
+              <a:t>7/27/2019</a:t>
             </a:fld>
             <a:endParaRPr lang="en-US"/>
           </a:p>
@@ -1002,7 +1007,7 @@
           <a:p>
             <a:fld id="{FF9C6F78-307D-4E37-89B5-F2F94C8E61CA}" type="datetimeFigureOut">
               <a:rPr lang="en-US" smtClean="0"/>
-              <a:t>7/22/2019</a:t>
+              <a:t>7/27/2019</a:t>
             </a:fld>
             <a:endParaRPr lang="en-US"/>
           </a:p>
@@ -1234,7 +1239,7 @@
           <a:p>
             <a:fld id="{FF9C6F78-307D-4E37-89B5-F2F94C8E61CA}" type="datetimeFigureOut">
               <a:rPr lang="en-US" smtClean="0"/>
-              <a:t>7/22/2019</a:t>
+              <a:t>7/27/2019</a:t>
             </a:fld>
             <a:endParaRPr lang="en-US"/>
           </a:p>
@@ -1601,7 +1606,7 @@
           <a:p>
             <a:fld id="{FF9C6F78-307D-4E37-89B5-F2F94C8E61CA}" type="datetimeFigureOut">
               <a:rPr lang="en-US" smtClean="0"/>
-              <a:t>7/22/2019</a:t>
+              <a:t>7/27/2019</a:t>
             </a:fld>
             <a:endParaRPr lang="en-US"/>
           </a:p>
@@ -1719,7 +1724,7 @@
           <a:p>
             <a:fld id="{FF9C6F78-307D-4E37-89B5-F2F94C8E61CA}" type="datetimeFigureOut">
               <a:rPr lang="en-US" smtClean="0"/>
-              <a:t>7/22/2019</a:t>
+              <a:t>7/27/2019</a:t>
             </a:fld>
             <a:endParaRPr lang="en-US"/>
           </a:p>
@@ -1814,7 +1819,7 @@
           <a:p>
             <a:fld id="{FF9C6F78-307D-4E37-89B5-F2F94C8E61CA}" type="datetimeFigureOut">
               <a:rPr lang="en-US" smtClean="0"/>
-              <a:t>7/22/2019</a:t>
+              <a:t>7/27/2019</a:t>
             </a:fld>
             <a:endParaRPr lang="en-US"/>
           </a:p>
@@ -2091,7 +2096,7 @@
           <a:p>
             <a:fld id="{FF9C6F78-307D-4E37-89B5-F2F94C8E61CA}" type="datetimeFigureOut">
               <a:rPr lang="en-US" smtClean="0"/>
-              <a:t>7/22/2019</a:t>
+              <a:t>7/27/2019</a:t>
             </a:fld>
             <a:endParaRPr lang="en-US"/>
           </a:p>
@@ -2348,7 +2353,7 @@
           <a:p>
             <a:fld id="{FF9C6F78-307D-4E37-89B5-F2F94C8E61CA}" type="datetimeFigureOut">
               <a:rPr lang="en-US" smtClean="0"/>
-              <a:t>7/22/2019</a:t>
+              <a:t>7/27/2019</a:t>
             </a:fld>
             <a:endParaRPr lang="en-US"/>
           </a:p>
@@ -2561,7 +2566,7 @@
           <a:p>
             <a:fld id="{FF9C6F78-307D-4E37-89B5-F2F94C8E61CA}" type="datetimeFigureOut">
               <a:rPr lang="en-US" smtClean="0"/>
-              <a:t>7/22/2019</a:t>
+              <a:t>7/27/2019</a:t>
             </a:fld>
             <a:endParaRPr lang="en-US"/>
           </a:p>
@@ -2968,10 +2973,10 @@
       </p:grpSpPr>
       <p:grpSp>
         <p:nvGrpSpPr>
-          <p:cNvPr id="76" name="Group 75">
+          <p:cNvPr id="78" name="Group 77">
             <a:extLst>
               <a:ext uri="{FF2B5EF4-FFF2-40B4-BE49-F238E27FC236}">
-                <a16:creationId xmlns:a16="http://schemas.microsoft.com/office/drawing/2014/main" id="{EBA04562-A8D5-40B4-859D-640104C3204F}"/>
+                <a16:creationId xmlns:a16="http://schemas.microsoft.com/office/drawing/2014/main" id="{D37BC0F0-88DE-41EF-9D14-67F0A13EAE67}"/>
               </a:ext>
             </a:extLst>
           </p:cNvPr>
@@ -2980,10 +2985,10 @@
         </p:nvGrpSpPr>
         <p:grpSpPr>
           <a:xfrm>
-            <a:off x="1273731" y="2597354"/>
-            <a:ext cx="13322410" cy="2712788"/>
-            <a:chOff x="1730931" y="2378279"/>
-            <a:chExt cx="13322410" cy="2712788"/>
+            <a:off x="1479916" y="4463639"/>
+            <a:ext cx="12550714" cy="2910495"/>
+            <a:chOff x="1479916" y="4463639"/>
+            <a:chExt cx="12550714" cy="2910495"/>
           </a:xfrm>
         </p:grpSpPr>
         <p:sp>
@@ -3000,7 +3005,7 @@
           </p:nvSpPr>
           <p:spPr>
             <a:xfrm>
-              <a:off x="7243894" y="2378279"/>
+              <a:off x="7416565" y="4463639"/>
               <a:ext cx="1057013" cy="285226"/>
             </a:xfrm>
             <a:prstGeom prst="rect">
@@ -3068,7 +3073,7 @@
           </p:nvSpPr>
           <p:spPr>
             <a:xfrm>
-              <a:off x="4410517" y="3005360"/>
+              <a:off x="3863482" y="5308111"/>
               <a:ext cx="1178653" cy="251670"/>
             </a:xfrm>
             <a:prstGeom prst="rect">
@@ -3136,7 +3141,7 @@
           </p:nvSpPr>
           <p:spPr>
             <a:xfrm>
-              <a:off x="10484143" y="2993820"/>
+              <a:off x="11169284" y="5308111"/>
               <a:ext cx="1178654" cy="251670"/>
             </a:xfrm>
             <a:prstGeom prst="rect">
@@ -3204,7 +3209,7 @@
           </p:nvSpPr>
           <p:spPr>
             <a:xfrm>
-              <a:off x="2831288" y="3802316"/>
+              <a:off x="1969971" y="6072680"/>
               <a:ext cx="1728132" cy="243282"/>
             </a:xfrm>
             <a:prstGeom prst="rect">
@@ -3272,7 +3277,7 @@
           </p:nvSpPr>
           <p:spPr>
             <a:xfrm>
-              <a:off x="5301846" y="3802313"/>
+              <a:off x="5262655" y="6064292"/>
               <a:ext cx="1518407" cy="251670"/>
             </a:xfrm>
             <a:prstGeom prst="rect">
@@ -3340,7 +3345,7 @@
           </p:nvSpPr>
           <p:spPr>
             <a:xfrm>
-              <a:off x="9019825" y="3760370"/>
+              <a:off x="8603698" y="6041429"/>
               <a:ext cx="1707160" cy="285227"/>
             </a:xfrm>
             <a:prstGeom prst="rect">
@@ -3408,7 +3413,7 @@
           </p:nvSpPr>
           <p:spPr>
             <a:xfrm>
-              <a:off x="11424495" y="3760370"/>
+              <a:off x="10999407" y="6041428"/>
               <a:ext cx="1518407" cy="285228"/>
             </a:xfrm>
             <a:prstGeom prst="rect">
@@ -3476,7 +3481,7 @@
           </p:nvSpPr>
           <p:spPr>
             <a:xfrm>
-              <a:off x="13939703" y="3760370"/>
+              <a:off x="12916992" y="6041428"/>
               <a:ext cx="851480" cy="285228"/>
             </a:xfrm>
             <a:prstGeom prst="rect">
@@ -3544,7 +3549,7 @@
           </p:nvSpPr>
           <p:spPr>
             <a:xfrm>
-              <a:off x="1730931" y="4811086"/>
+              <a:off x="1479916" y="7078422"/>
               <a:ext cx="1291904" cy="218114"/>
             </a:xfrm>
             <a:prstGeom prst="rect">
@@ -3612,8 +3617,8 @@
           </p:nvSpPr>
           <p:spPr>
             <a:xfrm>
-              <a:off x="3361891" y="4811086"/>
-              <a:ext cx="1514213" cy="218114"/>
+              <a:off x="2911030" y="7094153"/>
+              <a:ext cx="1345338" cy="202383"/>
             </a:xfrm>
             <a:prstGeom prst="rect">
               <a:avLst/>
@@ -3680,7 +3685,7 @@
           </p:nvSpPr>
           <p:spPr>
             <a:xfrm>
-              <a:off x="7260673" y="4811086"/>
+              <a:off x="6640937" y="7094153"/>
               <a:ext cx="661330" cy="218114"/>
             </a:xfrm>
             <a:prstGeom prst="rect">
@@ -3748,7 +3753,7 @@
           </p:nvSpPr>
           <p:spPr>
             <a:xfrm>
-              <a:off x="6242110" y="4811086"/>
+              <a:off x="5622374" y="7094153"/>
               <a:ext cx="855676" cy="218114"/>
             </a:xfrm>
             <a:prstGeom prst="rect">
@@ -3816,7 +3821,7 @@
           </p:nvSpPr>
           <p:spPr>
             <a:xfrm>
-              <a:off x="5244519" y="4811087"/>
+              <a:off x="4624783" y="7094154"/>
               <a:ext cx="834705" cy="218115"/>
             </a:xfrm>
             <a:prstGeom prst="rect">
@@ -3884,7 +3889,7 @@
           </p:nvSpPr>
           <p:spPr>
             <a:xfrm>
-              <a:off x="10394824" y="4795355"/>
+              <a:off x="9460333" y="7091220"/>
               <a:ext cx="1375795" cy="218114"/>
             </a:xfrm>
             <a:prstGeom prst="rect">
@@ -3952,7 +3957,7 @@
           </p:nvSpPr>
           <p:spPr>
             <a:xfrm>
-              <a:off x="8599762" y="4795355"/>
+              <a:off x="7785681" y="7094153"/>
               <a:ext cx="1375795" cy="218114"/>
             </a:xfrm>
             <a:prstGeom prst="rect">
@@ -4020,7 +4025,7 @@
           </p:nvSpPr>
           <p:spPr>
             <a:xfrm>
-              <a:off x="13677546" y="4717757"/>
+              <a:off x="12654835" y="7000824"/>
               <a:ext cx="1375795" cy="373310"/>
             </a:xfrm>
             <a:prstGeom prst="rect">
@@ -4088,7 +4093,7 @@
           </p:nvSpPr>
           <p:spPr>
             <a:xfrm>
-              <a:off x="12036185" y="4795355"/>
+              <a:off x="11066171" y="7091220"/>
               <a:ext cx="1375794" cy="218114"/>
             </a:xfrm>
             <a:prstGeom prst="rect">
@@ -4159,8 +4164,8 @@
           </p:nvCxnSpPr>
           <p:spPr>
             <a:xfrm flipH="1">
-              <a:off x="4999844" y="2663505"/>
-              <a:ext cx="2772557" cy="341855"/>
+              <a:off x="4452809" y="4748865"/>
+              <a:ext cx="3492263" cy="559246"/>
             </a:xfrm>
             <a:prstGeom prst="line">
               <a:avLst/>
@@ -4204,8 +4209,8 @@
           </p:nvCxnSpPr>
           <p:spPr>
             <a:xfrm>
-              <a:off x="7772401" y="2663505"/>
-              <a:ext cx="3301069" cy="330315"/>
+              <a:off x="7945072" y="4748865"/>
+              <a:ext cx="3813539" cy="559246"/>
             </a:xfrm>
             <a:prstGeom prst="line">
               <a:avLst/>
@@ -4249,8 +4254,8 @@
           </p:nvCxnSpPr>
           <p:spPr>
             <a:xfrm flipH="1">
-              <a:off x="3695354" y="3257030"/>
-              <a:ext cx="1304490" cy="545286"/>
+              <a:off x="2834037" y="5559781"/>
+              <a:ext cx="1618772" cy="512899"/>
             </a:xfrm>
             <a:prstGeom prst="line">
               <a:avLst/>
@@ -4294,8 +4299,8 @@
           </p:nvCxnSpPr>
           <p:spPr>
             <a:xfrm>
-              <a:off x="4999844" y="3257030"/>
-              <a:ext cx="1061206" cy="545283"/>
+              <a:off x="4452809" y="5559781"/>
+              <a:ext cx="1569050" cy="504511"/>
             </a:xfrm>
             <a:prstGeom prst="line">
               <a:avLst/>
@@ -4339,8 +4344,8 @@
           </p:nvCxnSpPr>
           <p:spPr>
             <a:xfrm flipH="1">
-              <a:off x="2376883" y="4045598"/>
-              <a:ext cx="1318471" cy="765488"/>
+              <a:off x="2125868" y="6315962"/>
+              <a:ext cx="708169" cy="762460"/>
             </a:xfrm>
             <a:prstGeom prst="line">
               <a:avLst/>
@@ -4384,8 +4389,8 @@
           </p:nvCxnSpPr>
           <p:spPr>
             <a:xfrm>
-              <a:off x="3695354" y="4045598"/>
-              <a:ext cx="423644" cy="765488"/>
+              <a:off x="2834037" y="6315962"/>
+              <a:ext cx="749662" cy="778191"/>
             </a:xfrm>
             <a:prstGeom prst="line">
               <a:avLst/>
@@ -4429,8 +4434,8 @@
           </p:nvCxnSpPr>
           <p:spPr>
             <a:xfrm flipH="1">
-              <a:off x="5661872" y="4053983"/>
-              <a:ext cx="399178" cy="757104"/>
+              <a:off x="5042136" y="6315962"/>
+              <a:ext cx="979723" cy="778192"/>
             </a:xfrm>
             <a:prstGeom prst="line">
               <a:avLst/>
@@ -4474,8 +4479,8 @@
           </p:nvCxnSpPr>
           <p:spPr>
             <a:xfrm>
-              <a:off x="6061050" y="4053983"/>
-              <a:ext cx="608898" cy="757103"/>
+              <a:off x="6021859" y="6315962"/>
+              <a:ext cx="28353" cy="778191"/>
             </a:xfrm>
             <a:prstGeom prst="line">
               <a:avLst/>
@@ -4519,8 +4524,8 @@
           </p:nvCxnSpPr>
           <p:spPr>
             <a:xfrm>
-              <a:off x="6061050" y="4053983"/>
-              <a:ext cx="1530288" cy="757103"/>
+              <a:off x="6021859" y="6315962"/>
+              <a:ext cx="949743" cy="778191"/>
             </a:xfrm>
             <a:prstGeom prst="line">
               <a:avLst/>
@@ -4564,8 +4569,8 @@
           </p:nvCxnSpPr>
           <p:spPr>
             <a:xfrm flipH="1">
-              <a:off x="9873405" y="3245490"/>
-              <a:ext cx="1200065" cy="514880"/>
+              <a:off x="9457278" y="5559781"/>
+              <a:ext cx="2301333" cy="481648"/>
             </a:xfrm>
             <a:prstGeom prst="line">
               <a:avLst/>
@@ -4609,8 +4614,8 @@
           </p:nvCxnSpPr>
           <p:spPr>
             <a:xfrm>
-              <a:off x="11073470" y="3245490"/>
-              <a:ext cx="1110229" cy="514880"/>
+              <a:off x="11758611" y="5559781"/>
+              <a:ext cx="0" cy="481647"/>
             </a:xfrm>
             <a:prstGeom prst="line">
               <a:avLst/>
@@ -4654,8 +4659,8 @@
           </p:nvCxnSpPr>
           <p:spPr>
             <a:xfrm>
-              <a:off x="11073470" y="3245490"/>
-              <a:ext cx="3291973" cy="514880"/>
+              <a:off x="11758611" y="5559781"/>
+              <a:ext cx="1584121" cy="481647"/>
             </a:xfrm>
             <a:prstGeom prst="line">
               <a:avLst/>
@@ -4699,8 +4704,8 @@
           </p:nvCxnSpPr>
           <p:spPr>
             <a:xfrm flipH="1">
-              <a:off x="9287660" y="4045597"/>
-              <a:ext cx="585745" cy="749758"/>
+              <a:off x="8473579" y="6326656"/>
+              <a:ext cx="983699" cy="767497"/>
             </a:xfrm>
             <a:prstGeom prst="line">
               <a:avLst/>
@@ -4744,8 +4749,8 @@
           </p:nvCxnSpPr>
           <p:spPr>
             <a:xfrm>
-              <a:off x="9873405" y="4045597"/>
-              <a:ext cx="1209317" cy="749758"/>
+              <a:off x="9457278" y="6326656"/>
+              <a:ext cx="690953" cy="764564"/>
             </a:xfrm>
             <a:prstGeom prst="line">
               <a:avLst/>
@@ -4788,9 +4793,9 @@
             <p:nvPr/>
           </p:nvCxnSpPr>
           <p:spPr>
-            <a:xfrm>
-              <a:off x="12183699" y="4045598"/>
-              <a:ext cx="540383" cy="749757"/>
+            <a:xfrm flipH="1">
+              <a:off x="11754068" y="6326656"/>
+              <a:ext cx="4543" cy="764564"/>
             </a:xfrm>
             <a:prstGeom prst="line">
               <a:avLst/>
@@ -4834,8 +4839,8 @@
           </p:nvCxnSpPr>
           <p:spPr>
             <a:xfrm flipH="1">
-              <a:off x="11082722" y="4045598"/>
-              <a:ext cx="1100977" cy="749757"/>
+              <a:off x="10148231" y="6326656"/>
+              <a:ext cx="1610380" cy="764564"/>
             </a:xfrm>
             <a:prstGeom prst="line">
               <a:avLst/>
@@ -4879,8 +4884,8 @@
           </p:nvCxnSpPr>
           <p:spPr>
             <a:xfrm>
-              <a:off x="9873405" y="4045597"/>
-              <a:ext cx="2850677" cy="749758"/>
+              <a:off x="9457278" y="6326656"/>
+              <a:ext cx="2296790" cy="764564"/>
             </a:xfrm>
             <a:prstGeom prst="line">
               <a:avLst/>
@@ -4924,8 +4929,8 @@
           </p:nvCxnSpPr>
           <p:spPr>
             <a:xfrm>
-              <a:off x="14365443" y="4045598"/>
-              <a:ext cx="1" cy="672159"/>
+              <a:off x="13342732" y="6326656"/>
+              <a:ext cx="1" cy="674168"/>
             </a:xfrm>
             <a:prstGeom prst="line">
               <a:avLst/>

</xml_diff>